<commit_message>
Minor updates to final presentation.
</commit_message>
<xml_diff>
--- a/Docs/EECS395.Spring2012.SnyderOneal.FinalPresentation.Instalog.pptx
+++ b/Docs/EECS395.Spring2012.SnyderOneal.FinalPresentation.Instalog.pptx
@@ -957,7 +957,21 @@
           <a:p>
             <a:r>
               <a:rPr lang="en-US" dirty="0" smtClean="0"/>
-              <a:t>Both (whoever implemented each)</a:t>
+              <a:t>Both (whoever implemented each</a:t>
+            </a:r>
+            <a:r>
+              <a:rPr lang="en-US" dirty="0" smtClean="0"/>
+              <a:t>)</a:t>
+            </a:r>
+          </a:p>
+          <a:p>
+            <a:r>
+              <a:rPr lang="en-US" dirty="0" err="1" smtClean="0"/>
+              <a:t>RtlNtStatusToDosError</a:t>
+            </a:r>
+            <a:r>
+              <a:rPr lang="en-US" smtClean="0"/>
+              <a:t> win2k</a:t>
             </a:r>
             <a:endParaRPr lang="en-US" dirty="0"/>
           </a:p>
@@ -1135,7 +1149,6 @@
               <a:rPr lang="en-US" dirty="0" smtClean="0"/>
               <a:t>Bill</a:t>
             </a:r>
-            <a:endParaRPr lang="en-US" dirty="0" smtClean="0"/>
           </a:p>
         </p:txBody>
       </p:sp>
@@ -1223,7 +1236,6 @@
               <a:rPr lang="en-US" dirty="0" smtClean="0"/>
               <a:t>Bill</a:t>
             </a:r>
-            <a:endParaRPr lang="en-US" dirty="0" smtClean="0"/>
           </a:p>
         </p:txBody>
       </p:sp>
@@ -1311,7 +1323,6 @@
               <a:rPr lang="en-US" dirty="0" smtClean="0"/>
               <a:t>Bill</a:t>
             </a:r>
-            <a:endParaRPr lang="en-US" dirty="0" smtClean="0"/>
           </a:p>
         </p:txBody>
       </p:sp>
@@ -4822,15 +4833,7 @@
           <a:p>
             <a:r>
               <a:rPr lang="en-US" dirty="0" smtClean="0"/>
-              <a:t>Graphical </a:t>
-            </a:r>
-            <a:r>
-              <a:rPr lang="en-US" dirty="0" smtClean="0"/>
-              <a:t>User </a:t>
-            </a:r>
-            <a:r>
-              <a:rPr lang="en-US" dirty="0" smtClean="0"/>
-              <a:t>Interface</a:t>
+              <a:t>Graphical User Interface</a:t>
             </a:r>
             <a:endParaRPr lang="en-US" dirty="0"/>
           </a:p>
@@ -4938,8 +4941,19 @@
           <a:p>
             <a:r>
               <a:rPr lang="en-US" dirty="0" smtClean="0"/>
-              <a:t>Large parts of this tool (Native registry wrapper, etc.) can be used in other projects</a:t>
-            </a:r>
+              <a:t>Large parts of this tool (Native registry wrapper, etc.) can be used in other </a:t>
+            </a:r>
+            <a:r>
+              <a:rPr lang="en-US" dirty="0" smtClean="0"/>
+              <a:t>projects</a:t>
+            </a:r>
+          </a:p>
+          <a:p>
+            <a:r>
+              <a:rPr lang="en-US" dirty="0" smtClean="0"/>
+              <a:t>We “Broke VC’s Mind”</a:t>
+            </a:r>
+            <a:endParaRPr lang="en-US" dirty="0" smtClean="0"/>
           </a:p>
           <a:p>
             <a:r>
@@ -5330,11 +5344,7 @@
           <a:p>
             <a:r>
               <a:rPr lang="en-US" dirty="0" smtClean="0"/>
-              <a:t>Running </a:t>
-            </a:r>
-            <a:r>
-              <a:rPr lang="en-US" dirty="0" smtClean="0"/>
-              <a:t>Processes</a:t>
+              <a:t>Running Processes</a:t>
             </a:r>
           </a:p>
           <a:p>
@@ -5364,16 +5374,11 @@
               <a:rPr lang="en-US" dirty="0" smtClean="0"/>
               <a:t>Implemented Spoofed DNS check</a:t>
             </a:r>
-            <a:endParaRPr lang="en-US" dirty="0" smtClean="0"/>
-          </a:p>
-          <a:p>
-            <a:r>
-              <a:rPr lang="en-US" dirty="0" smtClean="0"/>
-              <a:t>Services / </a:t>
-            </a:r>
-            <a:r>
-              <a:rPr lang="en-US" dirty="0" smtClean="0"/>
-              <a:t>Drivers</a:t>
+          </a:p>
+          <a:p>
+            <a:r>
+              <a:rPr lang="en-US" dirty="0" smtClean="0"/>
+              <a:t>Services / Drivers</a:t>
             </a:r>
           </a:p>
           <a:p>
@@ -5409,7 +5414,17 @@
           <a:p>
             <a:r>
               <a:rPr lang="en-US" dirty="0" smtClean="0"/>
-              <a:t>Installed Programs</a:t>
+              <a:t>Installed </a:t>
+            </a:r>
+            <a:r>
+              <a:rPr lang="en-US" dirty="0" smtClean="0"/>
+              <a:t>Programs</a:t>
+            </a:r>
+          </a:p>
+          <a:p>
+            <a:r>
+              <a:rPr lang="en-US" dirty="0" smtClean="0"/>
+              <a:t>Enabled support for XP RTM and XP SP1</a:t>
             </a:r>
             <a:endParaRPr lang="en-US" dirty="0" smtClean="0"/>
           </a:p>
@@ -5956,7 +5971,11 @@
           <a:p>
             <a:r>
               <a:rPr lang="en-US" dirty="0" smtClean="0"/>
-              <a:t>Remote Debugger + VMware work well in tandem</a:t>
+              <a:t>Remote Debugger + VMware work well in </a:t>
+            </a:r>
+            <a:r>
+              <a:rPr lang="en-US" dirty="0" smtClean="0"/>
+              <a:t>tandem</a:t>
             </a:r>
           </a:p>
         </p:txBody>

</xml_diff>